<commit_message>
lun. 11 janv. 2021 14:07:01
</commit_message>
<xml_diff>
--- a/Les tutoriels de la FFBA_page1.pptx
+++ b/Les tutoriels de la FFBA_page1.pptx
@@ -301,7 +301,7 @@
             <a:fld id="{77F9EBB9-3DB1-464B-8411-81488C3DC3B8}" type="datetimeFigureOut">
               <a:rPr lang="fr-FR" smtClean="0"/>
               <a:pPr/>
-              <a:t>25/11/2020</a:t>
+              <a:t>11/01/2021</a:t>
             </a:fld>
             <a:endParaRPr lang="fr-FR"/>
           </a:p>
@@ -468,7 +468,7 @@
             <a:fld id="{77F9EBB9-3DB1-464B-8411-81488C3DC3B8}" type="datetimeFigureOut">
               <a:rPr lang="fr-FR" smtClean="0"/>
               <a:pPr/>
-              <a:t>25/11/2020</a:t>
+              <a:t>11/01/2021</a:t>
             </a:fld>
             <a:endParaRPr lang="fr-FR"/>
           </a:p>
@@ -645,7 +645,7 @@
             <a:fld id="{77F9EBB9-3DB1-464B-8411-81488C3DC3B8}" type="datetimeFigureOut">
               <a:rPr lang="fr-FR" smtClean="0"/>
               <a:pPr/>
-              <a:t>25/11/2020</a:t>
+              <a:t>11/01/2021</a:t>
             </a:fld>
             <a:endParaRPr lang="fr-FR"/>
           </a:p>
@@ -812,7 +812,7 @@
             <a:fld id="{77F9EBB9-3DB1-464B-8411-81488C3DC3B8}" type="datetimeFigureOut">
               <a:rPr lang="fr-FR" smtClean="0"/>
               <a:pPr/>
-              <a:t>25/11/2020</a:t>
+              <a:t>11/01/2021</a:t>
             </a:fld>
             <a:endParaRPr lang="fr-FR"/>
           </a:p>
@@ -1055,7 +1055,7 @@
             <a:fld id="{77F9EBB9-3DB1-464B-8411-81488C3DC3B8}" type="datetimeFigureOut">
               <a:rPr lang="fr-FR" smtClean="0"/>
               <a:pPr/>
-              <a:t>25/11/2020</a:t>
+              <a:t>11/01/2021</a:t>
             </a:fld>
             <a:endParaRPr lang="fr-FR"/>
           </a:p>
@@ -1340,7 +1340,7 @@
             <a:fld id="{77F9EBB9-3DB1-464B-8411-81488C3DC3B8}" type="datetimeFigureOut">
               <a:rPr lang="fr-FR" smtClean="0"/>
               <a:pPr/>
-              <a:t>25/11/2020</a:t>
+              <a:t>11/01/2021</a:t>
             </a:fld>
             <a:endParaRPr lang="fr-FR"/>
           </a:p>
@@ -1759,7 +1759,7 @@
             <a:fld id="{77F9EBB9-3DB1-464B-8411-81488C3DC3B8}" type="datetimeFigureOut">
               <a:rPr lang="fr-FR" smtClean="0"/>
               <a:pPr/>
-              <a:t>25/11/2020</a:t>
+              <a:t>11/01/2021</a:t>
             </a:fld>
             <a:endParaRPr lang="fr-FR"/>
           </a:p>
@@ -1874,7 +1874,7 @@
             <a:fld id="{77F9EBB9-3DB1-464B-8411-81488C3DC3B8}" type="datetimeFigureOut">
               <a:rPr lang="fr-FR" smtClean="0"/>
               <a:pPr/>
-              <a:t>25/11/2020</a:t>
+              <a:t>11/01/2021</a:t>
             </a:fld>
             <a:endParaRPr lang="fr-FR"/>
           </a:p>
@@ -1966,7 +1966,7 @@
             <a:fld id="{77F9EBB9-3DB1-464B-8411-81488C3DC3B8}" type="datetimeFigureOut">
               <a:rPr lang="fr-FR" smtClean="0"/>
               <a:pPr/>
-              <a:t>25/11/2020</a:t>
+              <a:t>11/01/2021</a:t>
             </a:fld>
             <a:endParaRPr lang="fr-FR"/>
           </a:p>
@@ -2240,7 +2240,7 @@
             <a:fld id="{77F9EBB9-3DB1-464B-8411-81488C3DC3B8}" type="datetimeFigureOut">
               <a:rPr lang="fr-FR" smtClean="0"/>
               <a:pPr/>
-              <a:t>25/11/2020</a:t>
+              <a:t>11/01/2021</a:t>
             </a:fld>
             <a:endParaRPr lang="fr-FR"/>
           </a:p>
@@ -2490,7 +2490,7 @@
             <a:fld id="{77F9EBB9-3DB1-464B-8411-81488C3DC3B8}" type="datetimeFigureOut">
               <a:rPr lang="fr-FR" smtClean="0"/>
               <a:pPr/>
-              <a:t>25/11/2020</a:t>
+              <a:t>11/01/2021</a:t>
             </a:fld>
             <a:endParaRPr lang="fr-FR"/>
           </a:p>
@@ -2715,7 +2715,7 @@
             <a:fld id="{77F9EBB9-3DB1-464B-8411-81488C3DC3B8}" type="datetimeFigureOut">
               <a:rPr lang="fr-FR" smtClean="0"/>
               <a:pPr/>
-              <a:t>25/11/2020</a:t>
+              <a:t>11/01/2021</a:t>
             </a:fld>
             <a:endParaRPr lang="fr-FR"/>
           </a:p>
@@ -9956,11 +9956,7 @@
             </a:r>
             <a:r>
               <a:rPr lang="fr-FR" sz="1400" b="1" dirty="0" smtClean="0"/>
-              <a:t>dépôt </a:t>
-            </a:r>
-            <a:r>
-              <a:rPr lang="fr-FR" sz="1400" b="1" dirty="0" smtClean="0"/>
-              <a:t>03</a:t>
+              <a:t>dépôt 03</a:t>
             </a:r>
             <a:endParaRPr lang="fr-FR" sz="1200" b="1" dirty="0" smtClean="0"/>
           </a:p>
@@ -10381,7 +10377,7 @@
         </p:nvSpPr>
         <p:spPr>
           <a:xfrm>
-            <a:off x="285720" y="3517944"/>
+            <a:off x="71406" y="3517944"/>
             <a:ext cx="1214446" cy="553998"/>
           </a:xfrm>
           <a:prstGeom prst="rect">
@@ -10445,7 +10441,7 @@
         </p:nvSpPr>
         <p:spPr>
           <a:xfrm>
-            <a:off x="2143108" y="4357694"/>
+            <a:off x="1928794" y="4357694"/>
             <a:ext cx="1714512" cy="584775"/>
           </a:xfrm>
           <a:prstGeom prst="rect">
@@ -10465,11 +10461,7 @@
             </a:r>
             <a:r>
               <a:rPr lang="fr-FR" sz="1400" b="1" dirty="0" smtClean="0"/>
-              <a:t>dépôt </a:t>
-            </a:r>
-            <a:r>
-              <a:rPr lang="fr-FR" sz="1400" b="1" dirty="0" smtClean="0"/>
-              <a:t>02</a:t>
+              <a:t>dépôt 02</a:t>
             </a:r>
             <a:endParaRPr lang="fr-FR" sz="1200" b="1" dirty="0" smtClean="0"/>
           </a:p>
@@ -10486,7 +10478,7 @@
         </p:nvSpPr>
         <p:spPr>
           <a:xfrm>
-            <a:off x="3428992" y="3714752"/>
+            <a:off x="2928926" y="3714752"/>
             <a:ext cx="1928826" cy="553998"/>
           </a:xfrm>
           <a:prstGeom prst="rect">
@@ -10538,7 +10530,11 @@
           <a:p>
             <a:r>
               <a:rPr lang="fr-FR" sz="1400" b="1" dirty="0" smtClean="0"/>
-              <a:t>Origine UE </a:t>
+              <a:t>Origine </a:t>
+            </a:r>
+            <a:r>
+              <a:rPr lang="fr-FR" sz="1400" b="1" dirty="0" smtClean="0"/>
+              <a:t>EU </a:t>
             </a:r>
             <a:r>
               <a:rPr lang="fr-FR" sz="1200" b="1" dirty="0" smtClean="0"/>
@@ -10558,7 +10554,7 @@
         </p:nvCxnSpPr>
         <p:spPr>
           <a:xfrm rot="5400000" flipH="1" flipV="1">
-            <a:off x="616298" y="3241299"/>
+            <a:off x="259108" y="3241299"/>
             <a:ext cx="517572" cy="35719"/>
           </a:xfrm>
           <a:prstGeom prst="straightConnector1">
@@ -10591,7 +10587,7 @@
         </p:nvCxnSpPr>
         <p:spPr>
           <a:xfrm rot="5400000" flipH="1" flipV="1">
-            <a:off x="1571604" y="3429000"/>
+            <a:off x="1357290" y="3429000"/>
             <a:ext cx="928694" cy="71438"/>
           </a:xfrm>
           <a:prstGeom prst="straightConnector1">
@@ -10624,7 +10620,7 @@
         </p:nvCxnSpPr>
         <p:spPr>
           <a:xfrm rot="5400000" flipH="1" flipV="1">
-            <a:off x="2501092" y="3714752"/>
+            <a:off x="2072464" y="3714752"/>
             <a:ext cx="1285884" cy="1588"/>
           </a:xfrm>
           <a:prstGeom prst="straightConnector1">
@@ -10657,7 +10653,7 @@
         </p:nvCxnSpPr>
         <p:spPr>
           <a:xfrm rot="5400000" flipH="1" flipV="1">
-            <a:off x="3429786" y="3357562"/>
+            <a:off x="3072596" y="3357562"/>
             <a:ext cx="714380" cy="1588"/>
           </a:xfrm>
           <a:prstGeom prst="straightConnector1">
@@ -10690,7 +10686,7 @@
         </p:nvCxnSpPr>
         <p:spPr>
           <a:xfrm rot="5400000" flipH="1" flipV="1">
-            <a:off x="6036479" y="3178967"/>
+            <a:off x="5894397" y="3178967"/>
             <a:ext cx="357190" cy="1588"/>
           </a:xfrm>
           <a:prstGeom prst="straightConnector1">
@@ -10741,40 +10737,12 @@
           <a:p>
             <a:r>
               <a:rPr lang="fr-FR" dirty="0" smtClean="0"/>
-              <a:t>Zones en plus : lot fournisseur,   Lot d’achat</a:t>
-            </a:r>
-            <a:r>
-              <a:rPr lang="fr-FR" dirty="0" smtClean="0"/>
-              <a:t>,  référence commande</a:t>
+              <a:t>Zones en plus : lot fournisseur,   Lot d’achat,  référence commande</a:t>
             </a:r>
             <a:endParaRPr lang="fr-FR" dirty="0"/>
           </a:p>
         </p:txBody>
       </p:sp>
-      <p:pic>
-        <p:nvPicPr>
-          <p:cNvPr id="18" name="Image 17" descr="Capture d’écran 2020-11-24 212605.jpg"/>
-          <p:cNvPicPr>
-            <a:picLocks noChangeAspect="1"/>
-          </p:cNvPicPr>
-          <p:nvPr/>
-        </p:nvPicPr>
-        <p:blipFill>
-          <a:blip r:embed="rId2"/>
-          <a:stretch>
-            <a:fillRect/>
-          </a:stretch>
-        </p:blipFill>
-        <p:spPr>
-          <a:xfrm>
-            <a:off x="142876" y="1785926"/>
-            <a:ext cx="8858280" cy="1147598"/>
-          </a:xfrm>
-          <a:prstGeom prst="rect">
-            <a:avLst/>
-          </a:prstGeom>
-        </p:spPr>
-      </p:pic>
       <p:sp>
         <p:nvSpPr>
           <p:cNvPr id="22" name="ZoneTexte 21"/>
@@ -10783,7 +10751,7 @@
         </p:nvSpPr>
         <p:spPr>
           <a:xfrm>
-            <a:off x="6572264" y="4286256"/>
+            <a:off x="6500826" y="4214818"/>
             <a:ext cx="2571768" cy="553998"/>
           </a:xfrm>
           <a:prstGeom prst="rect">
@@ -10809,13 +10777,8 @@
             </a:r>
             <a:r>
               <a:rPr lang="fr-FR" sz="1200" b="1" dirty="0" smtClean="0"/>
-              <a:t>Lot d’achat pour la </a:t>
-            </a:r>
-            <a:r>
-              <a:rPr lang="fr-FR" sz="1200" b="1" dirty="0" smtClean="0"/>
-              <a:t>traçabilité</a:t>
-            </a:r>
-            <a:endParaRPr lang="fr-FR" sz="1200" b="1" dirty="0" smtClean="0"/>
+              <a:t>Lot d’achat pour la traçabilité</a:t>
+            </a:r>
           </a:p>
           <a:p>
             <a:endParaRPr lang="fr-FR" dirty="0"/>
@@ -10855,6 +10818,30 @@
           </a:fontRef>
         </p:style>
       </p:cxnSp>
+      <p:pic>
+        <p:nvPicPr>
+          <p:cNvPr id="20" name="Image 19" descr="Capture d’écran 2021-01-11 131831.jpg"/>
+          <p:cNvPicPr>
+            <a:picLocks noChangeAspect="1"/>
+          </p:cNvPicPr>
+          <p:nvPr/>
+        </p:nvPicPr>
+        <p:blipFill>
+          <a:blip r:embed="rId2"/>
+          <a:stretch>
+            <a:fillRect/>
+          </a:stretch>
+        </p:blipFill>
+        <p:spPr>
+          <a:xfrm>
+            <a:off x="142844" y="1785926"/>
+            <a:ext cx="9001156" cy="1068123"/>
+          </a:xfrm>
+          <a:prstGeom prst="rect">
+            <a:avLst/>
+          </a:prstGeom>
+        </p:spPr>
+      </p:pic>
     </p:spTree>
   </p:cSld>
   <p:clrMapOvr>
@@ -10938,23 +10925,7 @@
                   <a:srgbClr val="FF7F00"/>
                 </a:solidFill>
               </a:rPr>
-              <a:t>Copier le fichier </a:t>
-            </a:r>
-            <a:r>
-              <a:rPr lang="fr-FR" sz="2800" dirty="0" smtClean="0">
-                <a:solidFill>
-                  <a:srgbClr val="FF7F00"/>
-                </a:solidFill>
-              </a:rPr>
-              <a:t>local</a:t>
-            </a:r>
-            <a:r>
-              <a:rPr lang="fr-FR" sz="2800" dirty="0" smtClean="0">
-                <a:solidFill>
-                  <a:srgbClr val="FF7F00"/>
-                </a:solidFill>
-              </a:rPr>
-              <a:t/>
+              <a:t>Copier le fichier local</a:t>
             </a:r>
             <a:br>
               <a:rPr lang="fr-FR" sz="2800" dirty="0" smtClean="0">
@@ -10969,21 +10940,8 @@
                   <a:srgbClr val="FF7F00"/>
                 </a:solidFill>
               </a:rPr>
-              <a:t>explorer le répertoire </a:t>
-            </a:r>
-            <a:r>
-              <a:rPr lang="fr-FR" sz="2800" dirty="0" smtClean="0">
-                <a:solidFill>
-                  <a:srgbClr val="FF7F00"/>
-                </a:solidFill>
-              </a:rPr>
-              <a:t>d’accueil</a:t>
-            </a:r>
-            <a:endParaRPr lang="fr-FR" sz="2800" dirty="0" smtClean="0">
-              <a:solidFill>
-                <a:srgbClr val="FF7F00"/>
-              </a:solidFill>
-            </a:endParaRPr>
+              <a:t>explorer le répertoire d’accueil</a:t>
+            </a:r>
           </a:p>
           <a:p>
             <a:pPr algn="ctr">

</xml_diff>